<commit_message>
Added to Power Point
Included a description of the create similar changes and the new extended price on invoices.
</commit_message>
<xml_diff>
--- a/Release Powerpoints/V2.6.0.pptx
+++ b/Release Powerpoints/V2.6.0.pptx
@@ -845,7 +845,7 @@
           <a:p>
             <a:fld id="{CCED65F4-2A77-484B-94A0-5A930235145A}" type="datetimeFigureOut">
               <a:rPr lang="en-US" smtClean="0"/>
-              <a:t>06-Dec-17</a:t>
+              <a:t>12/6/2017</a:t>
             </a:fld>
             <a:endParaRPr lang="en-US"/>
           </a:p>
@@ -1096,7 +1096,7 @@
           <a:p>
             <a:fld id="{CCED65F4-2A77-484B-94A0-5A930235145A}" type="datetimeFigureOut">
               <a:rPr lang="en-US" smtClean="0"/>
-              <a:t>06-Dec-17</a:t>
+              <a:t>12/6/2017</a:t>
             </a:fld>
             <a:endParaRPr lang="en-US"/>
           </a:p>
@@ -1410,7 +1410,7 @@
           <a:p>
             <a:fld id="{CCED65F4-2A77-484B-94A0-5A930235145A}" type="datetimeFigureOut">
               <a:rPr lang="en-US" smtClean="0"/>
-              <a:t>06-Dec-17</a:t>
+              <a:t>12/6/2017</a:t>
             </a:fld>
             <a:endParaRPr lang="en-US"/>
           </a:p>
@@ -1751,7 +1751,7 @@
           <a:p>
             <a:fld id="{CCED65F4-2A77-484B-94A0-5A930235145A}" type="datetimeFigureOut">
               <a:rPr lang="en-US" smtClean="0"/>
-              <a:t>06-Dec-17</a:t>
+              <a:t>12/6/2017</a:t>
             </a:fld>
             <a:endParaRPr lang="en-US"/>
           </a:p>
@@ -2065,7 +2065,7 @@
           <a:p>
             <a:fld id="{CCED65F4-2A77-484B-94A0-5A930235145A}" type="datetimeFigureOut">
               <a:rPr lang="en-US" smtClean="0"/>
-              <a:t>06-Dec-17</a:t>
+              <a:t>12/6/2017</a:t>
             </a:fld>
             <a:endParaRPr lang="en-US"/>
           </a:p>
@@ -2458,7 +2458,7 @@
           <a:p>
             <a:fld id="{CCED65F4-2A77-484B-94A0-5A930235145A}" type="datetimeFigureOut">
               <a:rPr lang="en-US" smtClean="0"/>
-              <a:t>06-Dec-17</a:t>
+              <a:t>12/6/2017</a:t>
             </a:fld>
             <a:endParaRPr lang="en-US"/>
           </a:p>
@@ -2628,7 +2628,7 @@
           <a:p>
             <a:fld id="{CCED65F4-2A77-484B-94A0-5A930235145A}" type="datetimeFigureOut">
               <a:rPr lang="en-US" smtClean="0"/>
-              <a:t>06-Dec-17</a:t>
+              <a:t>12/6/2017</a:t>
             </a:fld>
             <a:endParaRPr lang="en-US"/>
           </a:p>
@@ -2808,7 +2808,7 @@
           <a:p>
             <a:fld id="{CCED65F4-2A77-484B-94A0-5A930235145A}" type="datetimeFigureOut">
               <a:rPr lang="en-US" smtClean="0"/>
-              <a:t>06-Dec-17</a:t>
+              <a:t>12/6/2017</a:t>
             </a:fld>
             <a:endParaRPr lang="en-US"/>
           </a:p>
@@ -2984,7 +2984,7 @@
           <a:p>
             <a:fld id="{CCED65F4-2A77-484B-94A0-5A930235145A}" type="datetimeFigureOut">
               <a:rPr lang="en-US" smtClean="0"/>
-              <a:t>06-Dec-17</a:t>
+              <a:t>12/6/2017</a:t>
             </a:fld>
             <a:endParaRPr lang="en-US"/>
           </a:p>
@@ -3231,7 +3231,7 @@
           <a:p>
             <a:fld id="{CCED65F4-2A77-484B-94A0-5A930235145A}" type="datetimeFigureOut">
               <a:rPr lang="en-US" smtClean="0"/>
-              <a:t>06-Dec-17</a:t>
+              <a:t>12/6/2017</a:t>
             </a:fld>
             <a:endParaRPr lang="en-US"/>
           </a:p>
@@ -3463,7 +3463,7 @@
           <a:p>
             <a:fld id="{CCED65F4-2A77-484B-94A0-5A930235145A}" type="datetimeFigureOut">
               <a:rPr lang="en-US" smtClean="0"/>
-              <a:t>06-Dec-17</a:t>
+              <a:t>12/6/2017</a:t>
             </a:fld>
             <a:endParaRPr lang="en-US"/>
           </a:p>
@@ -3837,7 +3837,7 @@
           <a:p>
             <a:fld id="{CCED65F4-2A77-484B-94A0-5A930235145A}" type="datetimeFigureOut">
               <a:rPr lang="en-US" smtClean="0"/>
-              <a:t>06-Dec-17</a:t>
+              <a:t>12/6/2017</a:t>
             </a:fld>
             <a:endParaRPr lang="en-US"/>
           </a:p>
@@ -3960,7 +3960,7 @@
           <a:p>
             <a:fld id="{CCED65F4-2A77-484B-94A0-5A930235145A}" type="datetimeFigureOut">
               <a:rPr lang="en-US" smtClean="0"/>
-              <a:t>06-Dec-17</a:t>
+              <a:t>12/6/2017</a:t>
             </a:fld>
             <a:endParaRPr lang="en-US"/>
           </a:p>
@@ -4055,7 +4055,7 @@
           <a:p>
             <a:fld id="{CCED65F4-2A77-484B-94A0-5A930235145A}" type="datetimeFigureOut">
               <a:rPr lang="en-US" smtClean="0"/>
-              <a:t>06-Dec-17</a:t>
+              <a:t>12/6/2017</a:t>
             </a:fld>
             <a:endParaRPr lang="en-US"/>
           </a:p>
@@ -4310,7 +4310,7 @@
           <a:p>
             <a:fld id="{CCED65F4-2A77-484B-94A0-5A930235145A}" type="datetimeFigureOut">
               <a:rPr lang="en-US" smtClean="0"/>
-              <a:t>06-Dec-17</a:t>
+              <a:t>12/6/2017</a:t>
             </a:fld>
             <a:endParaRPr lang="en-US"/>
           </a:p>
@@ -4573,7 +4573,7 @@
           <a:p>
             <a:fld id="{CCED65F4-2A77-484B-94A0-5A930235145A}" type="datetimeFigureOut">
               <a:rPr lang="en-US" smtClean="0"/>
-              <a:t>06-Dec-17</a:t>
+              <a:t>12/6/2017</a:t>
             </a:fld>
             <a:endParaRPr lang="en-US"/>
           </a:p>
@@ -5316,7 +5316,7 @@
           <a:p>
             <a:fld id="{CCED65F4-2A77-484B-94A0-5A930235145A}" type="datetimeFigureOut">
               <a:rPr lang="en-US" smtClean="0"/>
-              <a:t>06-Dec-17</a:t>
+              <a:t>12/6/2017</a:t>
             </a:fld>
             <a:endParaRPr lang="en-US"/>
           </a:p>
@@ -5949,7 +5949,7 @@
           <a:p>
             <a:r>
               <a:rPr lang="en-US" dirty="0"/>
-              <a:t>Reports</a:t>
+              <a:t>Enhancements</a:t>
             </a:r>
           </a:p>
         </p:txBody>
@@ -6378,7 +6378,10 @@
           <a:bodyPr/>
           <a:lstStyle/>
           <a:p>
-            <a:endParaRPr lang="en-US" dirty="0"/>
+            <a:r>
+              <a:rPr lang="en-US" dirty="0"/>
+              <a:t>Create Similar</a:t>
+            </a:r>
           </a:p>
         </p:txBody>
       </p:sp>
@@ -6410,7 +6413,30 @@
           </a:bodyPr>
           <a:lstStyle/>
           <a:p>
-            <a:endParaRPr lang="en-US" dirty="0"/>
+            <a:r>
+              <a:rPr lang="en-US" dirty="0"/>
+              <a:t>A user can now create a similar items to those already created.</a:t>
+            </a:r>
+          </a:p>
+          <a:p>
+            <a:r>
+              <a:rPr lang="en-US" dirty="0"/>
+              <a:t>While viewing an item there is now a create similar button.</a:t>
+            </a:r>
+          </a:p>
+          <a:p>
+            <a:r>
+              <a:rPr lang="en-US" dirty="0"/>
+              <a:t>Upon pressing a new </a:t>
+            </a:r>
+            <a:r>
+              <a:rPr lang="en-US" dirty="0" err="1"/>
+              <a:t>sku</a:t>
+            </a:r>
+            <a:r>
+              <a:rPr lang="en-US" dirty="0"/>
+              <a:t> will be created with all the same attributes of the item the user was viewing including quantity.</a:t>
+            </a:r>
           </a:p>
         </p:txBody>
       </p:sp>
@@ -6467,7 +6493,10 @@
           </a:bodyPr>
           <a:lstStyle/>
           <a:p>
-            <a:endParaRPr lang="en-US" dirty="0"/>
+            <a:r>
+              <a:rPr lang="en-US" dirty="0"/>
+              <a:t>Proper Extended Price</a:t>
+            </a:r>
           </a:p>
         </p:txBody>
       </p:sp>
@@ -6492,7 +6521,16 @@
           <a:bodyPr/>
           <a:lstStyle/>
           <a:p>
-            <a:endParaRPr lang="en-US" dirty="0"/>
+            <a:r>
+              <a:rPr lang="en-US" dirty="0"/>
+              <a:t>The current invoices have now been improved to show the correct Extended price.</a:t>
+            </a:r>
+          </a:p>
+          <a:p>
+            <a:r>
+              <a:rPr lang="en-US" dirty="0"/>
+              <a:t>It will now include Original Price of Item, Discount Amount, Quantity Sold, Discounted Price of Item (Original Price of Item – Discount Amount), and Extended Price (Quantity Sold * Discounted Price of Item).</a:t>
+            </a:r>
           </a:p>
         </p:txBody>
       </p:sp>

</xml_diff>